<commit_message>
initial implementation of Number Verification Service
</commit_message>
<xml_diff>
--- a/docs/Number Verification Microservice.pptx
+++ b/docs/Number Verification Microservice.pptx
@@ -4868,7 +4868,7 @@
             <a:pPr rtl="0"/>
             <a:fld id="{EBE77BE8-C92C-4478-BEC0-BA685856F54D}" type="datetime1">
               <a:rPr lang="en-GB" smtClean="0"/>
-              <a:t>14/05/2025</a:t>
+              <a:t>15/05/2025</a:t>
             </a:fld>
             <a:endParaRPr lang="en-GB"/>
           </a:p>
@@ -5050,7 +5050,7 @@
             <a:pPr rtl="0"/>
             <a:fld id="{BF695629-D1D6-472E-AD8D-B841B09640C4}" type="datetime1">
               <a:rPr lang="en-GB" smtClean="0"/>
-              <a:t>14/05/2025</a:t>
+              <a:t>15/05/2025</a:t>
             </a:fld>
             <a:endParaRPr lang="en-GB"/>
           </a:p>
@@ -5418,7 +5418,7 @@
             <a:pPr rtl="0"/>
             <a:fld id="{1A5657D3-E8CC-402E-9DD0-BFC4FEBDA829}" type="datetime1">
               <a:rPr lang="en-GB" smtClean="0"/>
-              <a:t>14/05/2025</a:t>
+              <a:t>15/05/2025</a:t>
             </a:fld>
             <a:endParaRPr lang="en-GB"/>
           </a:p>
@@ -5604,7 +5604,7 @@
             <a:pPr rtl="0"/>
             <a:fld id="{B9FA1D35-9279-4503-AA65-44459462ED41}" type="datetime1">
               <a:rPr lang="en-GB" smtClean="0"/>
-              <a:t>14/05/2025</a:t>
+              <a:t>15/05/2025</a:t>
             </a:fld>
             <a:endParaRPr lang="en-GB"/>
           </a:p>
@@ -5776,7 +5776,7 @@
             <a:pPr rtl="0"/>
             <a:fld id="{B9FA1D35-9279-4503-AA65-44459462ED41}" type="datetime1">
               <a:rPr lang="en-GB" smtClean="0"/>
-              <a:t>14/05/2025</a:t>
+              <a:t>15/05/2025</a:t>
             </a:fld>
             <a:endParaRPr lang="en-GB"/>
           </a:p>
@@ -5955,7 +5955,7 @@
             <a:pPr rtl="0"/>
             <a:fld id="{B9FA1D35-9279-4503-AA65-44459462ED41}" type="datetime1">
               <a:rPr lang="en-GB" smtClean="0"/>
-              <a:t>14/05/2025</a:t>
+              <a:t>15/05/2025</a:t>
             </a:fld>
             <a:endParaRPr lang="en-GB"/>
           </a:p>
@@ -6127,7 +6127,7 @@
             <a:pPr rtl="0"/>
             <a:fld id="{B9FA1D35-9279-4503-AA65-44459462ED41}" type="datetime1">
               <a:rPr lang="en-GB" smtClean="0"/>
-              <a:t>14/05/2025</a:t>
+              <a:t>15/05/2025</a:t>
             </a:fld>
             <a:endParaRPr lang="en-GB"/>
           </a:p>
@@ -6292,7 +6292,7 @@
             <a:pPr rtl="0"/>
             <a:fld id="{8307B592-45D3-43FD-9CAB-CF71C4EA4E88}" type="datetime1">
               <a:rPr lang="en-GB" smtClean="0"/>
-              <a:t>14/05/2025</a:t>
+              <a:t>15/05/2025</a:t>
             </a:fld>
             <a:endParaRPr lang="en-GB"/>
           </a:p>
@@ -6477,7 +6477,7 @@
             <a:pPr rtl="0"/>
             <a:fld id="{B9FA1D35-9279-4503-AA65-44459462ED41}" type="datetime1">
               <a:rPr lang="en-GB" smtClean="0"/>
-              <a:t>14/05/2025</a:t>
+              <a:t>15/05/2025</a:t>
             </a:fld>
             <a:endParaRPr lang="en-GB"/>
           </a:p>
@@ -6677,7 +6677,7 @@
             <a:pPr rtl="0"/>
             <a:fld id="{B9FA1D35-9279-4503-AA65-44459462ED41}" type="datetime1">
               <a:rPr lang="en-GB" smtClean="0"/>
-              <a:t>14/05/2025</a:t>
+              <a:t>15/05/2025</a:t>
             </a:fld>
             <a:endParaRPr lang="en-GB"/>
           </a:p>
@@ -6842,7 +6842,7 @@
             <a:pPr rtl="0"/>
             <a:fld id="{8307B592-45D3-43FD-9CAB-CF71C4EA4E88}" type="datetime1">
               <a:rPr lang="en-GB" smtClean="0"/>
-              <a:t>14/05/2025</a:t>
+              <a:t>15/05/2025</a:t>
             </a:fld>
             <a:endParaRPr lang="en-GB"/>
           </a:p>
@@ -7030,7 +7030,7 @@
             <a:pPr rtl="0"/>
             <a:fld id="{B9FA1D35-9279-4503-AA65-44459462ED41}" type="datetime1">
               <a:rPr lang="en-GB" smtClean="0"/>
-              <a:t>14/05/2025</a:t>
+              <a:t>15/05/2025</a:t>
             </a:fld>
             <a:endParaRPr lang="en-GB"/>
           </a:p>
@@ -7202,7 +7202,7 @@
             <a:pPr rtl="0"/>
             <a:fld id="{B9FA1D35-9279-4503-AA65-44459462ED41}" type="datetime1">
               <a:rPr lang="en-GB" smtClean="0"/>
-              <a:t>14/05/2025</a:t>
+              <a:t>15/05/2025</a:t>
             </a:fld>
             <a:endParaRPr lang="en-GB"/>
           </a:p>
@@ -7287,7 +7287,7 @@
             <a:pPr rtl="0"/>
             <a:fld id="{BF695629-D1D6-472E-AD8D-B841B09640C4}" type="datetime1">
               <a:rPr lang="en-GB" smtClean="0"/>
-              <a:t>14/05/2025</a:t>
+              <a:t>15/05/2025</a:t>
             </a:fld>
             <a:endParaRPr lang="en-GB"/>
           </a:p>
@@ -7475,7 +7475,7 @@
             <a:pPr rtl="0"/>
             <a:fld id="{B9FA1D35-9279-4503-AA65-44459462ED41}" type="datetime1">
               <a:rPr lang="en-GB" smtClean="0"/>
-              <a:t>14/05/2025</a:t>
+              <a:t>15/05/2025</a:t>
             </a:fld>
             <a:endParaRPr lang="en-GB"/>
           </a:p>
@@ -7640,7 +7640,7 @@
             <a:pPr rtl="0"/>
             <a:fld id="{8307B592-45D3-43FD-9CAB-CF71C4EA4E88}" type="datetime1">
               <a:rPr lang="en-GB" smtClean="0"/>
-              <a:t>14/05/2025</a:t>
+              <a:t>15/05/2025</a:t>
             </a:fld>
             <a:endParaRPr lang="en-GB"/>
           </a:p>
@@ -7798,7 +7798,7 @@
             <a:pPr rtl="0"/>
             <a:fld id="{B9FA1D35-9279-4503-AA65-44459462ED41}" type="datetime1">
               <a:rPr lang="en-GB" smtClean="0"/>
-              <a:t>14/05/2025</a:t>
+              <a:t>15/05/2025</a:t>
             </a:fld>
             <a:endParaRPr lang="en-GB"/>
           </a:p>
@@ -7963,7 +7963,7 @@
             <a:pPr rtl="0"/>
             <a:fld id="{B9FA1D35-9279-4503-AA65-44459462ED41}" type="datetime1">
               <a:rPr lang="en-GB" smtClean="0"/>
-              <a:t>14/05/2025</a:t>
+              <a:t>15/05/2025</a:t>
             </a:fld>
             <a:endParaRPr lang="en-GB"/>
           </a:p>
@@ -8121,7 +8121,7 @@
             <a:pPr rtl="0"/>
             <a:fld id="{B9FA1D35-9279-4503-AA65-44459462ED41}" type="datetime1">
               <a:rPr lang="en-GB" smtClean="0"/>
-              <a:t>14/05/2025</a:t>
+              <a:t>15/05/2025</a:t>
             </a:fld>
             <a:endParaRPr lang="en-GB"/>
           </a:p>
@@ -8286,7 +8286,7 @@
             <a:pPr rtl="0"/>
             <a:fld id="{8307B592-45D3-43FD-9CAB-CF71C4EA4E88}" type="datetime1">
               <a:rPr lang="en-GB" smtClean="0"/>
-              <a:t>14/05/2025</a:t>
+              <a:t>15/05/2025</a:t>
             </a:fld>
             <a:endParaRPr lang="en-GB"/>
           </a:p>
@@ -8450,7 +8450,7 @@
             <a:pPr rtl="0"/>
             <a:fld id="{B9FA1D35-9279-4503-AA65-44459462ED41}" type="datetime1">
               <a:rPr lang="en-GB" smtClean="0"/>
-              <a:t>14/05/2025</a:t>
+              <a:t>15/05/2025</a:t>
             </a:fld>
             <a:endParaRPr lang="en-GB"/>
           </a:p>
@@ -8629,7 +8629,7 @@
             <a:pPr rtl="0"/>
             <a:fld id="{B9FA1D35-9279-4503-AA65-44459462ED41}" type="datetime1">
               <a:rPr lang="en-GB" smtClean="0"/>
-              <a:t>14/05/2025</a:t>
+              <a:t>15/05/2025</a:t>
             </a:fld>
             <a:endParaRPr lang="en-GB"/>
           </a:p>
@@ -8794,7 +8794,7 @@
             <a:pPr rtl="0"/>
             <a:fld id="{8307B592-45D3-43FD-9CAB-CF71C4EA4E88}" type="datetime1">
               <a:rPr lang="en-GB" smtClean="0"/>
-              <a:t>14/05/2025</a:t>
+              <a:t>15/05/2025</a:t>
             </a:fld>
             <a:endParaRPr lang="en-GB"/>
           </a:p>
@@ -8980,7 +8980,7 @@
             <a:pPr rtl="0"/>
             <a:fld id="{B9FA1D35-9279-4503-AA65-44459462ED41}" type="datetime1">
               <a:rPr lang="en-GB" smtClean="0"/>
-              <a:t>14/05/2025</a:t>
+              <a:t>15/05/2025</a:t>
             </a:fld>
             <a:endParaRPr lang="en-GB"/>
           </a:p>
@@ -9145,7 +9145,7 @@
             <a:pPr rtl="0"/>
             <a:fld id="{8307B592-45D3-43FD-9CAB-CF71C4EA4E88}" type="datetime1">
               <a:rPr lang="en-GB" smtClean="0"/>
-              <a:t>14/05/2025</a:t>
+              <a:t>15/05/2025</a:t>
             </a:fld>
             <a:endParaRPr lang="en-GB"/>
           </a:p>
@@ -9303,7 +9303,7 @@
             <a:pPr rtl="0"/>
             <a:fld id="{B9FA1D35-9279-4503-AA65-44459462ED41}" type="datetime1">
               <a:rPr lang="en-GB" smtClean="0"/>
-              <a:t>14/05/2025</a:t>
+              <a:t>15/05/2025</a:t>
             </a:fld>
             <a:endParaRPr lang="en-GB"/>
           </a:p>
@@ -9468,7 +9468,7 @@
             <a:pPr rtl="0"/>
             <a:fld id="{8307B592-45D3-43FD-9CAB-CF71C4EA4E88}" type="datetime1">
               <a:rPr lang="en-GB" smtClean="0"/>
-              <a:t>14/05/2025</a:t>
+              <a:t>15/05/2025</a:t>
             </a:fld>
             <a:endParaRPr lang="en-GB"/>
           </a:p>
@@ -9626,7 +9626,7 @@
             <a:pPr rtl="0"/>
             <a:fld id="{B9FA1D35-9279-4503-AA65-44459462ED41}" type="datetime1">
               <a:rPr lang="en-GB" smtClean="0"/>
-              <a:t>14/05/2025</a:t>
+              <a:t>15/05/2025</a:t>
             </a:fld>
             <a:endParaRPr lang="en-GB"/>
           </a:p>
@@ -9804,7 +9804,7 @@
             <a:pPr rtl="0"/>
             <a:fld id="{B9FA1D35-9279-4503-AA65-44459462ED41}" type="datetime1">
               <a:rPr lang="en-GB" smtClean="0"/>
-              <a:t>14/05/2025</a:t>
+              <a:t>15/05/2025</a:t>
             </a:fld>
             <a:endParaRPr lang="en-GB"/>
           </a:p>
@@ -9969,7 +9969,7 @@
             <a:pPr rtl="0"/>
             <a:fld id="{8307B592-45D3-43FD-9CAB-CF71C4EA4E88}" type="datetime1">
               <a:rPr lang="en-GB" smtClean="0"/>
-              <a:t>14/05/2025</a:t>
+              <a:t>15/05/2025</a:t>
             </a:fld>
             <a:endParaRPr lang="en-GB"/>
           </a:p>
@@ -10117,7 +10117,7 @@
             <a:pPr rtl="0"/>
             <a:fld id="{F72FF6D9-2AE2-456A-9FD7-EB8F37D4F5AE}" type="datetime1">
               <a:rPr lang="en-GB" smtClean="0"/>
-              <a:t>14/05/2025</a:t>
+              <a:t>15/05/2025</a:t>
             </a:fld>
             <a:endParaRPr lang="en-GB"/>
           </a:p>
@@ -10289,7 +10289,7 @@
             <a:pPr rtl="0"/>
             <a:fld id="{B9FA1D35-9279-4503-AA65-44459462ED41}" type="datetime1">
               <a:rPr lang="en-GB" smtClean="0"/>
-              <a:t>14/05/2025</a:t>
+              <a:t>15/05/2025</a:t>
             </a:fld>
             <a:endParaRPr lang="en-GB"/>
           </a:p>
@@ -10429,7 +10429,7 @@
             <a:pPr rtl="0"/>
             <a:fld id="{8307B592-45D3-43FD-9CAB-CF71C4EA4E88}" type="datetime1">
               <a:rPr lang="en-GB" smtClean="0"/>
-              <a:t>14/05/2025</a:t>
+              <a:t>15/05/2025</a:t>
             </a:fld>
             <a:endParaRPr lang="en-GB"/>
           </a:p>
@@ -10569,7 +10569,7 @@
             <a:pPr rtl="0"/>
             <a:fld id="{1A5657D3-E8CC-402E-9DD0-BFC4FEBDA829}" type="datetime1">
               <a:rPr lang="en-GB" smtClean="0"/>
-              <a:t>14/05/2025</a:t>
+              <a:t>15/05/2025</a:t>
             </a:fld>
             <a:endParaRPr lang="en-GB"/>
           </a:p>
@@ -10727,7 +10727,7 @@
             <a:pPr rtl="0"/>
             <a:fld id="{B9FA1D35-9279-4503-AA65-44459462ED41}" type="datetime1">
               <a:rPr lang="en-GB" smtClean="0"/>
-              <a:t>14/05/2025</a:t>
+              <a:t>15/05/2025</a:t>
             </a:fld>
             <a:endParaRPr lang="en-GB"/>
           </a:p>
@@ -10892,7 +10892,7 @@
             <a:pPr rtl="0"/>
             <a:fld id="{B9FA1D35-9279-4503-AA65-44459462ED41}" type="datetime1">
               <a:rPr lang="en-GB" smtClean="0"/>
-              <a:t>14/05/2025</a:t>
+              <a:t>15/05/2025</a:t>
             </a:fld>
             <a:endParaRPr lang="en-GB"/>
           </a:p>
@@ -11057,7 +11057,7 @@
             <a:pPr rtl="0"/>
             <a:fld id="{B9FA1D35-9279-4503-AA65-44459462ED41}" type="datetime1">
               <a:rPr lang="en-GB" smtClean="0"/>
-              <a:t>14/05/2025</a:t>
+              <a:t>15/05/2025</a:t>
             </a:fld>
             <a:endParaRPr lang="en-GB"/>
           </a:p>
@@ -11222,7 +11222,7 @@
             <a:pPr rtl="0"/>
             <a:fld id="{B9FA1D35-9279-4503-AA65-44459462ED41}" type="datetime1">
               <a:rPr lang="en-GB" smtClean="0"/>
-              <a:t>14/05/2025</a:t>
+              <a:t>15/05/2025</a:t>
             </a:fld>
             <a:endParaRPr lang="en-GB"/>
           </a:p>
@@ -11394,7 +11394,7 @@
             <a:pPr rtl="0"/>
             <a:fld id="{8307B592-45D3-43FD-9CAB-CF71C4EA4E88}" type="datetime1">
               <a:rPr lang="en-GB" smtClean="0"/>
-              <a:t>14/05/2025</a:t>
+              <a:t>15/05/2025</a:t>
             </a:fld>
             <a:endParaRPr lang="en-GB"/>
           </a:p>
@@ -11566,7 +11566,7 @@
             <a:pPr rtl="0"/>
             <a:fld id="{B9FA1D35-9279-4503-AA65-44459462ED41}" type="datetime1">
               <a:rPr lang="en-GB" smtClean="0"/>
-              <a:t>14/05/2025</a:t>
+              <a:t>15/05/2025</a:t>
             </a:fld>
             <a:endParaRPr lang="en-GB"/>
           </a:p>
@@ -24661,7 +24661,7 @@
                 </a:solidFill>
                 <a:latin typeface="Consolas" panose="020B0609020204030204" pitchFamily="49" charset="0"/>
               </a:rPr>
-              <a:t>correlationId</a:t>
+              <a:t>hashedPhoneNumber</a:t>
             </a:r>
             <a:r>
               <a:rPr lang="en-GB" sz="1800" dirty="0">
@@ -24767,7 +24767,7 @@
                 </a:solidFill>
                 <a:latin typeface="Consolas" panose="020B0609020204030204" pitchFamily="49" charset="0"/>
               </a:rPr>
-              <a:t>verificationId</a:t>
+              <a:t>devicePhoneNumberVerified</a:t>
             </a:r>
             <a:r>
               <a:rPr lang="en-GB" sz="1800" dirty="0">
@@ -24778,79 +24778,7 @@
                 </a:solidFill>
                 <a:latin typeface="Consolas" panose="020B0609020204030204" pitchFamily="49" charset="0"/>
               </a:rPr>
-              <a:t>": "ver-12345",</a:t>
-            </a:r>
-          </a:p>
-          <a:p>
-            <a:pPr marL="0" indent="0">
-              <a:lnSpc>
-                <a:spcPct val="100000"/>
-              </a:lnSpc>
-              <a:spcBef>
-                <a:spcPts val="0"/>
-              </a:spcBef>
-              <a:spcAft>
-                <a:spcPts val="0"/>
-              </a:spcAft>
-              <a:buNone/>
-            </a:pPr>
-            <a:r>
-              <a:rPr lang="en-GB" sz="1800" dirty="0">
-                <a:solidFill>
-                  <a:srgbClr val="00B050">
-                    <a:alpha val="60000"/>
-                  </a:srgbClr>
-                </a:solidFill>
-                <a:latin typeface="Consolas" panose="020B0609020204030204" pitchFamily="49" charset="0"/>
-              </a:rPr>
-              <a:t>  "status": "MATCH",</a:t>
-            </a:r>
-          </a:p>
-          <a:p>
-            <a:pPr marL="0" indent="0">
-              <a:lnSpc>
-                <a:spcPct val="100000"/>
-              </a:lnSpc>
-              <a:spcBef>
-                <a:spcPts val="0"/>
-              </a:spcBef>
-              <a:spcAft>
-                <a:spcPts val="0"/>
-              </a:spcAft>
-              <a:buNone/>
-            </a:pPr>
-            <a:r>
-              <a:rPr lang="en-GB" sz="1800" dirty="0">
-                <a:solidFill>
-                  <a:srgbClr val="00B050">
-                    <a:alpha val="60000"/>
-                  </a:srgbClr>
-                </a:solidFill>
-                <a:latin typeface="Consolas" panose="020B0609020204030204" pitchFamily="49" charset="0"/>
-              </a:rPr>
-              <a:t>  "</a:t>
-            </a:r>
-            <a:r>
-              <a:rPr lang="en-GB" sz="1800" dirty="0" err="1">
-                <a:solidFill>
-                  <a:srgbClr val="00B050">
-                    <a:alpha val="60000"/>
-                  </a:srgbClr>
-                </a:solidFill>
-                <a:latin typeface="Consolas" panose="020B0609020204030204" pitchFamily="49" charset="0"/>
-              </a:rPr>
-              <a:t>verificationTime</a:t>
-            </a:r>
-            <a:r>
-              <a:rPr lang="en-GB" sz="1800" dirty="0">
-                <a:solidFill>
-                  <a:srgbClr val="00B050">
-                    <a:alpha val="60000"/>
-                  </a:srgbClr>
-                </a:solidFill>
-                <a:latin typeface="Consolas" panose="020B0609020204030204" pitchFamily="49" charset="0"/>
-              </a:rPr>
-              <a:t>": "2025-05-15T08:10:56Z"</a:t>
+              <a:t>": true</a:t>
             </a:r>
           </a:p>
           <a:p>
@@ -25412,54 +25340,7 @@
                 </a:solidFill>
                 <a:latin typeface="Consolas" panose="020B0609020204030204" pitchFamily="49" charset="0"/>
               </a:rPr>
-              <a:t>": "+34698765432",</a:t>
-            </a:r>
-          </a:p>
-          <a:p>
-            <a:pPr marL="0" indent="0">
-              <a:lnSpc>
-                <a:spcPct val="100000"/>
-              </a:lnSpc>
-              <a:spcBef>
-                <a:spcPts val="0"/>
-              </a:spcBef>
-              <a:spcAft>
-                <a:spcPts val="0"/>
-              </a:spcAft>
-              <a:buNone/>
-            </a:pPr>
-            <a:r>
-              <a:rPr lang="en-US" sz="1800" dirty="0">
-                <a:solidFill>
-                  <a:srgbClr val="00B050">
-                    <a:alpha val="60000"/>
-                  </a:srgbClr>
-                </a:solidFill>
-                <a:latin typeface="Consolas" panose="020B0609020204030204" pitchFamily="49" charset="0"/>
-              </a:rPr>
-              <a:t>  "</a:t>
-            </a:r>
-            <a:r>
-              <a:rPr lang="en-US" sz="1800" dirty="0" err="1">
-                <a:solidFill>
-                  <a:srgbClr val="00B050">
-                    <a:alpha val="60000"/>
-                  </a:srgbClr>
-                </a:solidFill>
-                <a:latin typeface="Consolas" panose="020B0609020204030204" pitchFamily="49" charset="0"/>
-              </a:rPr>
-              <a:t>retrievalTime</a:t>
-            </a:r>
-            <a:r>
-              <a:rPr lang="en-US" sz="1800" dirty="0">
-                <a:solidFill>
-                  <a:srgbClr val="00B050">
-                    <a:alpha val="60000"/>
-                  </a:srgbClr>
-                </a:solidFill>
-                <a:latin typeface="Consolas" panose="020B0609020204030204" pitchFamily="49" charset="0"/>
-              </a:rPr>
-              <a:t>": "2023-06-30T12:34:56Z"</a:t>
+              <a:t>": "+34698765432“</a:t>
             </a:r>
           </a:p>
           <a:p>
@@ -32515,6 +32396,15 @@
 </file>
 
 <file path=customXml/item1.xml><?xml version="1.0" encoding="utf-8"?>
+<?mso-contentType ?>
+<FormTemplates xmlns="http://schemas.microsoft.com/sharepoint/v3/contenttype/forms">
+  <Display>DocumentLibraryForm</Display>
+  <Edit>DocumentLibraryForm</Edit>
+  <New>DocumentLibraryForm</New>
+</FormTemplates>
+</file>
+
+<file path=customXml/item2.xml><?xml version="1.0" encoding="utf-8"?>
 <ct:contentTypeSchema xmlns:ct="http://schemas.microsoft.com/office/2006/metadata/contentType" xmlns:ma="http://schemas.microsoft.com/office/2006/metadata/properties/metaAttributes" ct:_="" ma:_="" ma:contentTypeName="Document" ma:contentTypeID="0x01010079F111ED35F8CC479449609E8A0923A6" ma:contentTypeVersion="18" ma:contentTypeDescription="Create a new document." ma:contentTypeScope="" ma:versionID="22a266b9fa9a230c5a512669d8b298c3">
   <xsd:schema xmlns:xsd="http://www.w3.org/2001/XMLSchema" xmlns:xs="http://www.w3.org/2001/XMLSchema" xmlns:p="http://schemas.microsoft.com/office/2006/metadata/properties" xmlns:ns1="http://schemas.microsoft.com/sharepoint/v3" xmlns:ns2="71af3243-3dd4-4a8d-8c0d-dd76da1f02a5" xmlns:ns3="16c05727-aa75-4e4a-9b5f-8a80a1165891" xmlns:ns4="230e9df3-be65-4c73-a93b-d1236ebd677e" targetNamespace="http://schemas.microsoft.com/office/2006/metadata/properties" ma:root="true" ma:fieldsID="eddc33fff6b14141ee5c74a0d29ea6a1" ns1:_="" ns2:_="" ns3:_="" ns4:_="">
     <xsd:import namespace="http://schemas.microsoft.com/sharepoint/v3"/>
@@ -32790,15 +32680,6 @@
 </ct:contentTypeSchema>
 </file>
 
-<file path=customXml/item2.xml><?xml version="1.0" encoding="utf-8"?>
-<?mso-contentType ?>
-<FormTemplates xmlns="http://schemas.microsoft.com/sharepoint/v3/contenttype/forms">
-  <Display>DocumentLibraryForm</Display>
-  <Edit>DocumentLibraryForm</Edit>
-  <New>DocumentLibraryForm</New>
-</FormTemplates>
-</file>
-
 <file path=customXml/item3.xml><?xml version="1.0" encoding="utf-8"?>
 <p:properties xmlns:p="http://schemas.microsoft.com/office/2006/metadata/properties" xmlns:xsi="http://www.w3.org/2001/XMLSchema-instance" xmlns:pc="http://schemas.microsoft.com/office/infopath/2007/PartnerControls">
   <documentManagement>
@@ -32819,6 +32700,14 @@
 </file>
 
 <file path=customXml/itemProps1.xml><?xml version="1.0" encoding="utf-8"?>
+<ds:datastoreItem xmlns:ds="http://schemas.openxmlformats.org/officeDocument/2006/customXml" ds:itemID="{904751AB-E840-446F-8D49-E697067EC887}">
+  <ds:schemaRefs>
+    <ds:schemaRef ds:uri="http://schemas.microsoft.com/sharepoint/v3/contenttype/forms"/>
+  </ds:schemaRefs>
+</ds:datastoreItem>
+</file>
+
+<file path=customXml/itemProps2.xml><?xml version="1.0" encoding="utf-8"?>
 <ds:datastoreItem xmlns:ds="http://schemas.openxmlformats.org/officeDocument/2006/customXml" ds:itemID="{DE4876F9-7AE1-498D-B8FE-1E3AD703D2AF}">
   <ds:schemaRefs>
     <ds:schemaRef ds:uri="http://schemas.microsoft.com/office/2006/metadata/contentType"/>
@@ -32835,14 +32724,6 @@
     <ds:schemaRef ds:uri="http://purl.org/dc/elements/1.1/"/>
     <ds:schemaRef ds:uri="http://purl.org/dc/terms/"/>
     <ds:schemaRef ds:uri="http://schemas.microsoft.com/internal/obd"/>
-  </ds:schemaRefs>
-</ds:datastoreItem>
-</file>
-
-<file path=customXml/itemProps2.xml><?xml version="1.0" encoding="utf-8"?>
-<ds:datastoreItem xmlns:ds="http://schemas.openxmlformats.org/officeDocument/2006/customXml" ds:itemID="{904751AB-E840-446F-8D49-E697067EC887}">
-  <ds:schemaRefs>
-    <ds:schemaRef ds:uri="http://schemas.microsoft.com/sharepoint/v3/contenttype/forms"/>
   </ds:schemaRefs>
 </ds:datastoreItem>
 </file>

</xml_diff>